<commit_message>
refactor redundant codes to functions
</commit_message>
<xml_diff>
--- a/Using Luigi to control RNA-seq data processing pipeline.pptx
+++ b/Using Luigi to control RNA-seq data processing pipeline.pptx
@@ -17,9 +17,11 @@
     <p:sldId id="264" r:id="rId11"/>
     <p:sldId id="262" r:id="rId12"/>
     <p:sldId id="265" r:id="rId13"/>
-    <p:sldId id="266" r:id="rId14"/>
-    <p:sldId id="267" r:id="rId15"/>
-    <p:sldId id="268" r:id="rId16"/>
+    <p:sldId id="271" r:id="rId14"/>
+    <p:sldId id="266" r:id="rId15"/>
+    <p:sldId id="267" r:id="rId16"/>
+    <p:sldId id="272" r:id="rId17"/>
+    <p:sldId id="268" r:id="rId18"/>
   </p:sldIdLst>
   <p:sldSz cx="12192000" cy="6858000"/>
   <p:notesSz cx="6858000" cy="9144000"/>
@@ -8985,7 +8987,7 @@
           <a:effectLst/>
           <a:extLst>
             <a:ext uri="{91240B29-F687-4f45-9708-019B960494DF}">
-              <a14:hiddenLine xmlns:a14="http://schemas.microsoft.com/office/drawing/2010/main" xmlns="" w="9525">
+              <a14:hiddenLine xmlns="" xmlns:a14="http://schemas.microsoft.com/office/drawing/2010/main" w="9525">
                 <a:solidFill>
                   <a:srgbClr val="000000"/>
                 </a:solidFill>
@@ -9178,7 +9180,7 @@
             <a:fld id="{08B9EBBA-996F-894A-B54A-D6246ED52CEA}" type="datetimeFigureOut">
               <a:rPr lang="en-US" dirty="0"/>
               <a:pPr/>
-              <a:t>12/1/2019</a:t>
+              <a:t>12/2/2019</a:t>
             </a:fld>
             <a:endParaRPr lang="en-US" dirty="0"/>
           </a:p>
@@ -9493,7 +9495,7 @@
             <a:fld id="{18C79C5D-2A6F-F04D-97DA-BEF2467B64E4}" type="datetimeFigureOut">
               <a:rPr lang="en-US" dirty="0"/>
               <a:pPr/>
-              <a:t>12/1/2019</a:t>
+              <a:t>12/2/2019</a:t>
             </a:fld>
             <a:endParaRPr lang="en-US" dirty="0"/>
           </a:p>
@@ -9978,7 +9980,7 @@
             <a:fld id="{8DFA1846-DA80-1C48-A609-854EA85C59AD}" type="datetimeFigureOut">
               <a:rPr lang="en-US" dirty="0"/>
               <a:pPr/>
-              <a:t>12/1/2019</a:t>
+              <a:t>12/2/2019</a:t>
             </a:fld>
             <a:endParaRPr lang="en-US" dirty="0"/>
           </a:p>
@@ -10344,7 +10346,7 @@
             <a:fld id="{FBF54567-0DE4-3F47-BF90-CB84690072F9}" type="datetimeFigureOut">
               <a:rPr lang="en-US" dirty="0"/>
               <a:pPr/>
-              <a:t>12/1/2019</a:t>
+              <a:t>12/2/2019</a:t>
             </a:fld>
             <a:endParaRPr lang="en-US" dirty="0"/>
           </a:p>
@@ -10495,7 +10497,7 @@
           <a:ln/>
           <a:extLst>
             <a:ext uri="{91240B29-F687-4f45-9708-019B960494DF}">
-              <a14:hiddenLine xmlns:a14="http://schemas.microsoft.com/office/drawing/2010/main" xmlns="" w="9525">
+              <a14:hiddenLine xmlns="" xmlns:a14="http://schemas.microsoft.com/office/drawing/2010/main" w="9525">
                 <a:solidFill>
                   <a:srgbClr val="000000"/>
                 </a:solidFill>
@@ -10614,7 +10616,7 @@
             <a:fld id="{C6C52C72-DE31-F449-A4ED-4C594FD91407}" type="datetimeFigureOut">
               <a:rPr lang="en-US" dirty="0"/>
               <a:pPr/>
-              <a:t>12/1/2019</a:t>
+              <a:t>12/2/2019</a:t>
             </a:fld>
             <a:endParaRPr lang="en-US" dirty="0"/>
           </a:p>
@@ -10767,7 +10769,7 @@
           <a:ln/>
           <a:extLst>
             <a:ext uri="{91240B29-F687-4f45-9708-019B960494DF}">
-              <a14:hiddenLine xmlns:a14="http://schemas.microsoft.com/office/drawing/2010/main" xmlns="" w="9525">
+              <a14:hiddenLine xmlns="" xmlns:a14="http://schemas.microsoft.com/office/drawing/2010/main" w="9525">
                 <a:solidFill>
                   <a:srgbClr val="000000"/>
                 </a:solidFill>
@@ -10896,7 +10898,7 @@
             <a:fld id="{ED62726E-379B-B349-9EED-81ED093FA806}" type="datetimeFigureOut">
               <a:rPr lang="en-US" dirty="0"/>
               <a:pPr/>
-              <a:t>12/1/2019</a:t>
+              <a:t>12/2/2019</a:t>
             </a:fld>
             <a:endParaRPr lang="en-US" dirty="0"/>
           </a:p>
@@ -11047,7 +11049,7 @@
           <a:ln/>
           <a:extLst>
             <a:ext uri="{91240B29-F687-4f45-9708-019B960494DF}">
-              <a14:hiddenLine xmlns:a14="http://schemas.microsoft.com/office/drawing/2010/main" xmlns="" w="9525">
+              <a14:hiddenLine xmlns="" xmlns:a14="http://schemas.microsoft.com/office/drawing/2010/main" w="9525">
                 <a:solidFill>
                   <a:srgbClr val="000000"/>
                 </a:solidFill>
@@ -11176,7 +11178,7 @@
             <a:fld id="{9B3A1323-8D79-1946-B0D7-40001CF92E9D}" type="datetimeFigureOut">
               <a:rPr lang="en-US" dirty="0"/>
               <a:pPr/>
-              <a:t>12/1/2019</a:t>
+              <a:t>12/2/2019</a:t>
             </a:fld>
             <a:endParaRPr lang="en-US" dirty="0"/>
           </a:p>
@@ -11516,7 +11518,7 @@
             <a:fld id="{8DFA1846-DA80-1C48-A609-854EA85C59AD}" type="datetimeFigureOut">
               <a:rPr lang="en-US" dirty="0"/>
               <a:pPr/>
-              <a:t>12/1/2019</a:t>
+              <a:t>12/2/2019</a:t>
             </a:fld>
             <a:endParaRPr lang="en-US" dirty="0"/>
           </a:p>
@@ -11667,7 +11669,7 @@
           <a:ln/>
           <a:extLst>
             <a:ext uri="{91240B29-F687-4f45-9708-019B960494DF}">
-              <a14:hiddenLine xmlns:a14="http://schemas.microsoft.com/office/drawing/2010/main" xmlns="" w="9525">
+              <a14:hiddenLine xmlns="" xmlns:a14="http://schemas.microsoft.com/office/drawing/2010/main" w="9525">
                 <a:solidFill>
                   <a:srgbClr val="000000"/>
                 </a:solidFill>
@@ -11852,7 +11854,7 @@
             <a:fld id="{57302355-E14B-8545-A8F8-0FE83CC9D524}" type="datetimeFigureOut">
               <a:rPr lang="en-US" dirty="0"/>
               <a:pPr/>
-              <a:t>12/1/2019</a:t>
+              <a:t>12/2/2019</a:t>
             </a:fld>
             <a:endParaRPr lang="en-US" dirty="0"/>
           </a:p>
@@ -12003,7 +12005,7 @@
           <a:ln/>
           <a:extLst>
             <a:ext uri="{91240B29-F687-4f45-9708-019B960494DF}">
-              <a14:hiddenLine xmlns:a14="http://schemas.microsoft.com/office/drawing/2010/main" xmlns="" w="9525">
+              <a14:hiddenLine xmlns="" xmlns:a14="http://schemas.microsoft.com/office/drawing/2010/main" w="9525">
                 <a:solidFill>
                   <a:srgbClr val="000000"/>
                 </a:solidFill>
@@ -12326,7 +12328,7 @@
             <a:fld id="{02640F58-564D-2B4F-AE67-E407BA4FCF45}" type="datetimeFigureOut">
               <a:rPr lang="en-US" dirty="0"/>
               <a:pPr/>
-              <a:t>12/1/2019</a:t>
+              <a:t>12/2/2019</a:t>
             </a:fld>
             <a:endParaRPr lang="en-US" dirty="0"/>
           </a:p>
@@ -12477,7 +12479,7 @@
           <a:ln/>
           <a:extLst>
             <a:ext uri="{91240B29-F687-4f45-9708-019B960494DF}">
-              <a14:hiddenLine xmlns:a14="http://schemas.microsoft.com/office/drawing/2010/main" xmlns="" w="9525">
+              <a14:hiddenLine xmlns="" xmlns:a14="http://schemas.microsoft.com/office/drawing/2010/main" w="9525">
                 <a:solidFill>
                   <a:srgbClr val="000000"/>
                 </a:solidFill>
@@ -12544,7 +12546,7 @@
             <a:fld id="{F13A34C8-038E-2045-AF43-DF7DBB8E0E9E}" type="datetimeFigureOut">
               <a:rPr lang="en-US" dirty="0"/>
               <a:pPr/>
-              <a:t>12/1/2019</a:t>
+              <a:t>12/2/2019</a:t>
             </a:fld>
             <a:endParaRPr lang="en-US" dirty="0"/>
           </a:p>
@@ -12636,7 +12638,7 @@
             <a:fld id="{8818C68F-D26B-8F47-958C-23B49CF8A634}" type="datetimeFigureOut">
               <a:rPr lang="en-US" dirty="0"/>
               <a:pPr/>
-              <a:t>12/1/2019</a:t>
+              <a:t>12/2/2019</a:t>
             </a:fld>
             <a:endParaRPr lang="en-US" dirty="0"/>
           </a:p>
@@ -12900,7 +12902,7 @@
           <a:ln/>
           <a:extLst>
             <a:ext uri="{91240B29-F687-4f45-9708-019B960494DF}">
-              <a14:hiddenLine xmlns:a14="http://schemas.microsoft.com/office/drawing/2010/main" xmlns="" w="9525">
+              <a14:hiddenLine xmlns="" xmlns:a14="http://schemas.microsoft.com/office/drawing/2010/main" w="9525">
                 <a:solidFill>
                   <a:srgbClr val="000000"/>
                 </a:solidFill>
@@ -13100,7 +13102,7 @@
             <a:fld id="{D0DF5E60-9974-AC48-9591-99C2BB44B7CF}" type="datetimeFigureOut">
               <a:rPr lang="en-US" dirty="0"/>
               <a:pPr/>
-              <a:t>12/1/2019</a:t>
+              <a:t>12/2/2019</a:t>
             </a:fld>
             <a:endParaRPr lang="en-US" dirty="0"/>
           </a:p>
@@ -13410,7 +13412,7 @@
             <a:fld id="{18C79C5D-2A6F-F04D-97DA-BEF2467B64E4}" type="datetimeFigureOut">
               <a:rPr lang="en-US" dirty="0"/>
               <a:pPr/>
-              <a:t>12/1/2019</a:t>
+              <a:t>12/2/2019</a:t>
             </a:fld>
             <a:endParaRPr lang="en-US" dirty="0"/>
           </a:p>
@@ -13677,7 +13679,7 @@
             <a:fld id="{09B482E8-6E0E-1B4F-B1FD-C69DB9E858D9}" type="datetimeFigureOut">
               <a:rPr lang="en-US" dirty="0"/>
               <a:pPr/>
-              <a:t>12/1/2019</a:t>
+              <a:t>12/2/2019</a:t>
             </a:fld>
             <a:endParaRPr lang="en-US" dirty="0"/>
           </a:p>
@@ -24084,46 +24086,6 @@
       </p:sp>
       <p:sp>
         <p:nvSpPr>
-          <p:cNvPr id="12" name="Right Arrow 11"/>
-          <p:cNvSpPr/>
-          <p:nvPr/>
-        </p:nvSpPr>
-        <p:spPr>
-          <a:xfrm rot="5400000">
-            <a:off x="3842421" y="4259862"/>
-            <a:ext cx="951034" cy="294405"/>
-          </a:xfrm>
-          <a:prstGeom prst="rightArrow">
-            <a:avLst/>
-          </a:prstGeom>
-        </p:spPr>
-        <p:style>
-          <a:lnRef idx="2">
-            <a:schemeClr val="accent1">
-              <a:shade val="50000"/>
-            </a:schemeClr>
-          </a:lnRef>
-          <a:fillRef idx="1">
-            <a:schemeClr val="accent1"/>
-          </a:fillRef>
-          <a:effectRef idx="0">
-            <a:schemeClr val="accent1"/>
-          </a:effectRef>
-          <a:fontRef idx="minor">
-            <a:schemeClr val="lt1"/>
-          </a:fontRef>
-        </p:style>
-        <p:txBody>
-          <a:bodyPr rtlCol="0" anchor="ctr"/>
-          <a:lstStyle/>
-          <a:p>
-            <a:pPr algn="ctr"/>
-            <a:endParaRPr lang="en-US"/>
-          </a:p>
-        </p:txBody>
-      </p:sp>
-      <p:sp>
-        <p:nvSpPr>
           <p:cNvPr id="14" name="Right Arrow 13"/>
           <p:cNvSpPr/>
           <p:nvPr/>
@@ -25802,6 +25764,760 @@
 </file>
 
 <file path=ppt/slides/slide13.xml><?xml version="1.0" encoding="utf-8"?>
+<p:sld xmlns:a="http://schemas.openxmlformats.org/drawingml/2006/main" xmlns:r="http://schemas.openxmlformats.org/officeDocument/2006/relationships" xmlns:p="http://schemas.openxmlformats.org/presentationml/2006/main">
+  <p:cSld>
+    <p:spTree>
+      <p:nvGrpSpPr>
+        <p:cNvPr id="1" name=""/>
+        <p:cNvGrpSpPr/>
+        <p:nvPr/>
+      </p:nvGrpSpPr>
+      <p:grpSpPr>
+        <a:xfrm>
+          <a:off x="0" y="0"/>
+          <a:ext cx="0" cy="0"/>
+          <a:chOff x="0" y="0"/>
+          <a:chExt cx="0" cy="0"/>
+        </a:xfrm>
+      </p:grpSpPr>
+      <p:sp>
+        <p:nvSpPr>
+          <p:cNvPr id="2" name="Title 1"/>
+          <p:cNvSpPr>
+            <a:spLocks noGrp="1"/>
+          </p:cNvSpPr>
+          <p:nvPr>
+            <p:ph type="title"/>
+          </p:nvPr>
+        </p:nvSpPr>
+        <p:spPr/>
+        <p:txBody>
+          <a:bodyPr/>
+          <a:lstStyle/>
+          <a:p>
+            <a:r>
+              <a:rPr lang="en-US" dirty="0" smtClean="0"/>
+              <a:t>Luigi tasks: </a:t>
+            </a:r>
+            <a:r>
+              <a:rPr lang="en-US" dirty="0" err="1" smtClean="0"/>
+              <a:t>Wrapup</a:t>
+            </a:r>
+            <a:endParaRPr lang="en-US" dirty="0"/>
+          </a:p>
+        </p:txBody>
+      </p:sp>
+      <p:sp>
+        <p:nvSpPr>
+          <p:cNvPr id="4" name="Freeform 3"/>
+          <p:cNvSpPr/>
+          <p:nvPr/>
+        </p:nvSpPr>
+        <p:spPr>
+          <a:xfrm>
+            <a:off x="423180" y="2415219"/>
+            <a:ext cx="2216046" cy="1446570"/>
+          </a:xfrm>
+          <a:custGeom>
+            <a:avLst/>
+            <a:gdLst>
+              <a:gd name="connsiteX0" fmla="*/ 0 w 3298031"/>
+              <a:gd name="connsiteY0" fmla="*/ 0 h 1978818"/>
+              <a:gd name="connsiteX1" fmla="*/ 3298031 w 3298031"/>
+              <a:gd name="connsiteY1" fmla="*/ 0 h 1978818"/>
+              <a:gd name="connsiteX2" fmla="*/ 3298031 w 3298031"/>
+              <a:gd name="connsiteY2" fmla="*/ 1978818 h 1978818"/>
+              <a:gd name="connsiteX3" fmla="*/ 0 w 3298031"/>
+              <a:gd name="connsiteY3" fmla="*/ 1978818 h 1978818"/>
+              <a:gd name="connsiteX4" fmla="*/ 0 w 3298031"/>
+              <a:gd name="connsiteY4" fmla="*/ 0 h 1978818"/>
+            </a:gdLst>
+            <a:ahLst/>
+            <a:cxnLst>
+              <a:cxn ang="0">
+                <a:pos x="connsiteX0" y="connsiteY0"/>
+              </a:cxn>
+              <a:cxn ang="0">
+                <a:pos x="connsiteX1" y="connsiteY1"/>
+              </a:cxn>
+              <a:cxn ang="0">
+                <a:pos x="connsiteX2" y="connsiteY2"/>
+              </a:cxn>
+              <a:cxn ang="0">
+                <a:pos x="connsiteX3" y="connsiteY3"/>
+              </a:cxn>
+              <a:cxn ang="0">
+                <a:pos x="connsiteX4" y="connsiteY4"/>
+              </a:cxn>
+            </a:cxnLst>
+            <a:rect l="l" t="t" r="r" b="b"/>
+            <a:pathLst>
+              <a:path w="3298031" h="1978818">
+                <a:moveTo>
+                  <a:pt x="0" y="0"/>
+                </a:moveTo>
+                <a:lnTo>
+                  <a:pt x="3298031" y="0"/>
+                </a:lnTo>
+                <a:lnTo>
+                  <a:pt x="3298031" y="1978818"/>
+                </a:lnTo>
+                <a:lnTo>
+                  <a:pt x="0" y="1978818"/>
+                </a:lnTo>
+                <a:lnTo>
+                  <a:pt x="0" y="0"/>
+                </a:lnTo>
+                <a:close/>
+              </a:path>
+            </a:pathLst>
+          </a:custGeom>
+        </p:spPr>
+        <p:style>
+          <a:lnRef idx="2">
+            <a:schemeClr val="lt1">
+              <a:hueOff val="0"/>
+              <a:satOff val="0"/>
+              <a:lumOff val="0"/>
+              <a:alphaOff val="0"/>
+            </a:schemeClr>
+          </a:lnRef>
+          <a:fillRef idx="1">
+            <a:schemeClr val="accent1">
+              <a:hueOff val="0"/>
+              <a:satOff val="0"/>
+              <a:lumOff val="0"/>
+              <a:alphaOff val="0"/>
+            </a:schemeClr>
+          </a:fillRef>
+          <a:effectRef idx="0">
+            <a:schemeClr val="accent1">
+              <a:hueOff val="0"/>
+              <a:satOff val="0"/>
+              <a:lumOff val="0"/>
+              <a:alphaOff val="0"/>
+            </a:schemeClr>
+          </a:effectRef>
+          <a:fontRef idx="minor">
+            <a:schemeClr val="lt1"/>
+          </a:fontRef>
+        </p:style>
+        <p:txBody>
+          <a:bodyPr spcFirstLastPara="0" vert="horz" wrap="square" lIns="91440" tIns="91440" rIns="91440" bIns="91440" numCol="1" spcCol="1270" anchor="ctr" anchorCtr="0">
+            <a:noAutofit/>
+          </a:bodyPr>
+          <a:lstStyle/>
+          <a:p>
+            <a:pPr lvl="0" algn="ctr" defTabSz="1066800">
+              <a:lnSpc>
+                <a:spcPct val="90000"/>
+              </a:lnSpc>
+              <a:spcBef>
+                <a:spcPct val="0"/>
+              </a:spcBef>
+              <a:spcAft>
+                <a:spcPct val="35000"/>
+              </a:spcAft>
+            </a:pPr>
+            <a:r>
+              <a:rPr lang="en-US" b="1" kern="1200" dirty="0" err="1" smtClean="0"/>
+              <a:t>MapFigure</a:t>
+            </a:r>
+            <a:endParaRPr lang="en-US" b="1" kern="1200" dirty="0" smtClean="0"/>
+          </a:p>
+          <a:p>
+            <a:pPr lvl="0" algn="ctr" defTabSz="1066800">
+              <a:lnSpc>
+                <a:spcPct val="90000"/>
+              </a:lnSpc>
+              <a:spcBef>
+                <a:spcPct val="0"/>
+              </a:spcBef>
+              <a:spcAft>
+                <a:spcPct val="35000"/>
+              </a:spcAft>
+            </a:pPr>
+            <a:r>
+              <a:rPr lang="en-US" sz="1600" kern="1200" dirty="0" smtClean="0"/>
+              <a:t>Task</a:t>
+            </a:r>
+          </a:p>
+          <a:p>
+            <a:pPr lvl="0" algn="ctr" defTabSz="1066800">
+              <a:lnSpc>
+                <a:spcPct val="90000"/>
+              </a:lnSpc>
+              <a:spcBef>
+                <a:spcPct val="0"/>
+              </a:spcBef>
+              <a:spcAft>
+                <a:spcPct val="35000"/>
+              </a:spcAft>
+            </a:pPr>
+            <a:r>
+              <a:rPr lang="en-US" sz="1600" kern="1200" dirty="0" smtClean="0"/>
+              <a:t>Get QC Plots</a:t>
+            </a:r>
+            <a:endParaRPr lang="en-US" sz="1600" kern="1200" dirty="0"/>
+          </a:p>
+        </p:txBody>
+      </p:sp>
+      <p:sp>
+        <p:nvSpPr>
+          <p:cNvPr id="5" name="Freeform 4"/>
+          <p:cNvSpPr/>
+          <p:nvPr/>
+        </p:nvSpPr>
+        <p:spPr>
+          <a:xfrm>
+            <a:off x="469991" y="4863296"/>
+            <a:ext cx="2203832" cy="1722258"/>
+          </a:xfrm>
+          <a:custGeom>
+            <a:avLst/>
+            <a:gdLst>
+              <a:gd name="connsiteX0" fmla="*/ 0 w 3298031"/>
+              <a:gd name="connsiteY0" fmla="*/ 0 h 1978818"/>
+              <a:gd name="connsiteX1" fmla="*/ 3298031 w 3298031"/>
+              <a:gd name="connsiteY1" fmla="*/ 0 h 1978818"/>
+              <a:gd name="connsiteX2" fmla="*/ 3298031 w 3298031"/>
+              <a:gd name="connsiteY2" fmla="*/ 1978818 h 1978818"/>
+              <a:gd name="connsiteX3" fmla="*/ 0 w 3298031"/>
+              <a:gd name="connsiteY3" fmla="*/ 1978818 h 1978818"/>
+              <a:gd name="connsiteX4" fmla="*/ 0 w 3298031"/>
+              <a:gd name="connsiteY4" fmla="*/ 0 h 1978818"/>
+            </a:gdLst>
+            <a:ahLst/>
+            <a:cxnLst>
+              <a:cxn ang="0">
+                <a:pos x="connsiteX0" y="connsiteY0"/>
+              </a:cxn>
+              <a:cxn ang="0">
+                <a:pos x="connsiteX1" y="connsiteY1"/>
+              </a:cxn>
+              <a:cxn ang="0">
+                <a:pos x="connsiteX2" y="connsiteY2"/>
+              </a:cxn>
+              <a:cxn ang="0">
+                <a:pos x="connsiteX3" y="connsiteY3"/>
+              </a:cxn>
+              <a:cxn ang="0">
+                <a:pos x="connsiteX4" y="connsiteY4"/>
+              </a:cxn>
+            </a:cxnLst>
+            <a:rect l="l" t="t" r="r" b="b"/>
+            <a:pathLst>
+              <a:path w="3298031" h="1978818">
+                <a:moveTo>
+                  <a:pt x="0" y="0"/>
+                </a:moveTo>
+                <a:lnTo>
+                  <a:pt x="3298031" y="0"/>
+                </a:lnTo>
+                <a:lnTo>
+                  <a:pt x="3298031" y="1978818"/>
+                </a:lnTo>
+                <a:lnTo>
+                  <a:pt x="0" y="1978818"/>
+                </a:lnTo>
+                <a:lnTo>
+                  <a:pt x="0" y="0"/>
+                </a:lnTo>
+                <a:close/>
+              </a:path>
+            </a:pathLst>
+          </a:custGeom>
+        </p:spPr>
+        <p:style>
+          <a:lnRef idx="2">
+            <a:schemeClr val="lt1">
+              <a:hueOff val="0"/>
+              <a:satOff val="0"/>
+              <a:lumOff val="0"/>
+              <a:alphaOff val="0"/>
+            </a:schemeClr>
+          </a:lnRef>
+          <a:fillRef idx="1">
+            <a:schemeClr val="accent1">
+              <a:hueOff val="0"/>
+              <a:satOff val="0"/>
+              <a:lumOff val="0"/>
+              <a:alphaOff val="0"/>
+            </a:schemeClr>
+          </a:fillRef>
+          <a:effectRef idx="0">
+            <a:schemeClr val="accent1">
+              <a:hueOff val="0"/>
+              <a:satOff val="0"/>
+              <a:lumOff val="0"/>
+              <a:alphaOff val="0"/>
+            </a:schemeClr>
+          </a:effectRef>
+          <a:fontRef idx="minor">
+            <a:schemeClr val="lt1"/>
+          </a:fontRef>
+        </p:style>
+        <p:txBody>
+          <a:bodyPr spcFirstLastPara="0" vert="horz" wrap="square" lIns="91440" tIns="91440" rIns="91440" bIns="91440" numCol="1" spcCol="1270" anchor="ctr" anchorCtr="0">
+            <a:noAutofit/>
+          </a:bodyPr>
+          <a:lstStyle/>
+          <a:p>
+            <a:pPr lvl="0" algn="ctr" defTabSz="1066800">
+              <a:lnSpc>
+                <a:spcPct val="90000"/>
+              </a:lnSpc>
+              <a:spcBef>
+                <a:spcPct val="0"/>
+              </a:spcBef>
+              <a:spcAft>
+                <a:spcPct val="35000"/>
+              </a:spcAft>
+            </a:pPr>
+            <a:r>
+              <a:rPr lang="en-US" b="1" kern="1200" dirty="0" err="1" smtClean="0"/>
+              <a:t>CleanCounts</a:t>
+            </a:r>
+            <a:endParaRPr lang="en-US" b="1" kern="1200" dirty="0" smtClean="0"/>
+          </a:p>
+          <a:p>
+            <a:pPr lvl="0" algn="ctr" defTabSz="1066800">
+              <a:lnSpc>
+                <a:spcPct val="90000"/>
+              </a:lnSpc>
+              <a:spcBef>
+                <a:spcPct val="0"/>
+              </a:spcBef>
+              <a:spcAft>
+                <a:spcPct val="35000"/>
+              </a:spcAft>
+            </a:pPr>
+            <a:r>
+              <a:rPr lang="en-US" sz="1600" kern="1200" dirty="0" smtClean="0"/>
+              <a:t>Task</a:t>
+            </a:r>
+          </a:p>
+          <a:p>
+            <a:pPr lvl="0" algn="ctr" defTabSz="1066800">
+              <a:lnSpc>
+                <a:spcPct val="90000"/>
+              </a:lnSpc>
+              <a:spcBef>
+                <a:spcPct val="0"/>
+              </a:spcBef>
+              <a:spcAft>
+                <a:spcPct val="35000"/>
+              </a:spcAft>
+            </a:pPr>
+            <a:r>
+              <a:rPr lang="en-US" sz="1600" kern="1200" dirty="0" smtClean="0"/>
+              <a:t>Sum by gene</a:t>
+            </a:r>
+          </a:p>
+          <a:p>
+            <a:pPr lvl="0" algn="ctr" defTabSz="1066800">
+              <a:lnSpc>
+                <a:spcPct val="90000"/>
+              </a:lnSpc>
+              <a:spcBef>
+                <a:spcPct val="0"/>
+              </a:spcBef>
+              <a:spcAft>
+                <a:spcPct val="35000"/>
+              </a:spcAft>
+            </a:pPr>
+            <a:r>
+              <a:rPr lang="en-US" sz="1600" dirty="0" smtClean="0"/>
+              <a:t>Filter expression</a:t>
+            </a:r>
+            <a:endParaRPr lang="en-US" sz="1600" kern="1200" dirty="0"/>
+          </a:p>
+        </p:txBody>
+      </p:sp>
+      <p:sp>
+        <p:nvSpPr>
+          <p:cNvPr id="6" name="Right Arrow 5"/>
+          <p:cNvSpPr/>
+          <p:nvPr/>
+        </p:nvSpPr>
+        <p:spPr>
+          <a:xfrm rot="3631409">
+            <a:off x="2393541" y="3356048"/>
+            <a:ext cx="1104422" cy="309767"/>
+          </a:xfrm>
+          <a:prstGeom prst="rightArrow">
+            <a:avLst/>
+          </a:prstGeom>
+        </p:spPr>
+        <p:style>
+          <a:lnRef idx="2">
+            <a:schemeClr val="accent1">
+              <a:shade val="50000"/>
+            </a:schemeClr>
+          </a:lnRef>
+          <a:fillRef idx="1">
+            <a:schemeClr val="accent1"/>
+          </a:fillRef>
+          <a:effectRef idx="0">
+            <a:schemeClr val="accent1"/>
+          </a:effectRef>
+          <a:fontRef idx="minor">
+            <a:schemeClr val="lt1"/>
+          </a:fontRef>
+        </p:style>
+        <p:txBody>
+          <a:bodyPr rtlCol="0" anchor="ctr"/>
+          <a:lstStyle/>
+          <a:p>
+            <a:pPr algn="ctr"/>
+            <a:endParaRPr lang="en-US"/>
+          </a:p>
+        </p:txBody>
+      </p:sp>
+      <p:sp>
+        <p:nvSpPr>
+          <p:cNvPr id="7" name="Freeform 6"/>
+          <p:cNvSpPr/>
+          <p:nvPr/>
+        </p:nvSpPr>
+        <p:spPr>
+          <a:xfrm>
+            <a:off x="3252278" y="3831332"/>
+            <a:ext cx="2216046" cy="1446570"/>
+          </a:xfrm>
+          <a:custGeom>
+            <a:avLst/>
+            <a:gdLst>
+              <a:gd name="connsiteX0" fmla="*/ 0 w 3298031"/>
+              <a:gd name="connsiteY0" fmla="*/ 0 h 1978818"/>
+              <a:gd name="connsiteX1" fmla="*/ 3298031 w 3298031"/>
+              <a:gd name="connsiteY1" fmla="*/ 0 h 1978818"/>
+              <a:gd name="connsiteX2" fmla="*/ 3298031 w 3298031"/>
+              <a:gd name="connsiteY2" fmla="*/ 1978818 h 1978818"/>
+              <a:gd name="connsiteX3" fmla="*/ 0 w 3298031"/>
+              <a:gd name="connsiteY3" fmla="*/ 1978818 h 1978818"/>
+              <a:gd name="connsiteX4" fmla="*/ 0 w 3298031"/>
+              <a:gd name="connsiteY4" fmla="*/ 0 h 1978818"/>
+            </a:gdLst>
+            <a:ahLst/>
+            <a:cxnLst>
+              <a:cxn ang="0">
+                <a:pos x="connsiteX0" y="connsiteY0"/>
+              </a:cxn>
+              <a:cxn ang="0">
+                <a:pos x="connsiteX1" y="connsiteY1"/>
+              </a:cxn>
+              <a:cxn ang="0">
+                <a:pos x="connsiteX2" y="connsiteY2"/>
+              </a:cxn>
+              <a:cxn ang="0">
+                <a:pos x="connsiteX3" y="connsiteY3"/>
+              </a:cxn>
+              <a:cxn ang="0">
+                <a:pos x="connsiteX4" y="connsiteY4"/>
+              </a:cxn>
+            </a:cxnLst>
+            <a:rect l="l" t="t" r="r" b="b"/>
+            <a:pathLst>
+              <a:path w="3298031" h="1978818">
+                <a:moveTo>
+                  <a:pt x="0" y="0"/>
+                </a:moveTo>
+                <a:lnTo>
+                  <a:pt x="3298031" y="0"/>
+                </a:lnTo>
+                <a:lnTo>
+                  <a:pt x="3298031" y="1978818"/>
+                </a:lnTo>
+                <a:lnTo>
+                  <a:pt x="0" y="1978818"/>
+                </a:lnTo>
+                <a:lnTo>
+                  <a:pt x="0" y="0"/>
+                </a:lnTo>
+                <a:close/>
+              </a:path>
+            </a:pathLst>
+          </a:custGeom>
+        </p:spPr>
+        <p:style>
+          <a:lnRef idx="2">
+            <a:schemeClr val="lt1">
+              <a:hueOff val="0"/>
+              <a:satOff val="0"/>
+              <a:lumOff val="0"/>
+              <a:alphaOff val="0"/>
+            </a:schemeClr>
+          </a:lnRef>
+          <a:fillRef idx="1">
+            <a:schemeClr val="accent1">
+              <a:hueOff val="0"/>
+              <a:satOff val="0"/>
+              <a:lumOff val="0"/>
+              <a:alphaOff val="0"/>
+            </a:schemeClr>
+          </a:fillRef>
+          <a:effectRef idx="0">
+            <a:schemeClr val="accent1">
+              <a:hueOff val="0"/>
+              <a:satOff val="0"/>
+              <a:lumOff val="0"/>
+              <a:alphaOff val="0"/>
+            </a:schemeClr>
+          </a:effectRef>
+          <a:fontRef idx="minor">
+            <a:schemeClr val="lt1"/>
+          </a:fontRef>
+        </p:style>
+        <p:txBody>
+          <a:bodyPr spcFirstLastPara="0" vert="horz" wrap="square" lIns="91440" tIns="91440" rIns="91440" bIns="91440" numCol="1" spcCol="1270" anchor="ctr" anchorCtr="0">
+            <a:noAutofit/>
+          </a:bodyPr>
+          <a:lstStyle/>
+          <a:p>
+            <a:pPr lvl="0" algn="ctr" defTabSz="1066800">
+              <a:lnSpc>
+                <a:spcPct val="90000"/>
+              </a:lnSpc>
+              <a:spcBef>
+                <a:spcPct val="0"/>
+              </a:spcBef>
+              <a:spcAft>
+                <a:spcPct val="35000"/>
+              </a:spcAft>
+            </a:pPr>
+            <a:r>
+              <a:rPr lang="en-US" b="1" kern="1200" dirty="0" err="1" smtClean="0"/>
+              <a:t>AllReports</a:t>
+            </a:r>
+            <a:endParaRPr lang="en-US" b="1" kern="1200" dirty="0" smtClean="0"/>
+          </a:p>
+          <a:p>
+            <a:pPr lvl="0" algn="ctr" defTabSz="1066800">
+              <a:lnSpc>
+                <a:spcPct val="90000"/>
+              </a:lnSpc>
+              <a:spcBef>
+                <a:spcPct val="0"/>
+              </a:spcBef>
+              <a:spcAft>
+                <a:spcPct val="35000"/>
+              </a:spcAft>
+            </a:pPr>
+            <a:r>
+              <a:rPr lang="en-US" sz="1600" kern="1200" dirty="0" err="1" smtClean="0"/>
+              <a:t>WrapperTask</a:t>
+            </a:r>
+            <a:endParaRPr lang="en-US" sz="1600" kern="1200" dirty="0" smtClean="0"/>
+          </a:p>
+          <a:p>
+            <a:pPr lvl="0" algn="ctr" defTabSz="1066800">
+              <a:lnSpc>
+                <a:spcPct val="90000"/>
+              </a:lnSpc>
+              <a:spcBef>
+                <a:spcPct val="0"/>
+              </a:spcBef>
+              <a:spcAft>
+                <a:spcPct val="35000"/>
+              </a:spcAft>
+            </a:pPr>
+            <a:r>
+              <a:rPr lang="en-US" sz="1600" kern="1200" dirty="0" smtClean="0"/>
+              <a:t>Get all reports</a:t>
+            </a:r>
+            <a:endParaRPr lang="en-US" sz="1600" kern="1200" dirty="0"/>
+          </a:p>
+        </p:txBody>
+      </p:sp>
+      <p:sp>
+        <p:nvSpPr>
+          <p:cNvPr id="8" name="Right Arrow 7"/>
+          <p:cNvSpPr/>
+          <p:nvPr/>
+        </p:nvSpPr>
+        <p:spPr>
+          <a:xfrm rot="18375979">
+            <a:off x="2438514" y="5463510"/>
+            <a:ext cx="1104422" cy="309767"/>
+          </a:xfrm>
+          <a:prstGeom prst="rightArrow">
+            <a:avLst/>
+          </a:prstGeom>
+        </p:spPr>
+        <p:style>
+          <a:lnRef idx="2">
+            <a:schemeClr val="accent1">
+              <a:shade val="50000"/>
+            </a:schemeClr>
+          </a:lnRef>
+          <a:fillRef idx="1">
+            <a:schemeClr val="accent1"/>
+          </a:fillRef>
+          <a:effectRef idx="0">
+            <a:schemeClr val="accent1"/>
+          </a:effectRef>
+          <a:fontRef idx="minor">
+            <a:schemeClr val="lt1"/>
+          </a:fontRef>
+        </p:style>
+        <p:txBody>
+          <a:bodyPr rtlCol="0" anchor="ctr"/>
+          <a:lstStyle/>
+          <a:p>
+            <a:pPr algn="ctr"/>
+            <a:endParaRPr lang="en-US"/>
+          </a:p>
+        </p:txBody>
+      </p:sp>
+      <p:pic>
+        <p:nvPicPr>
+          <p:cNvPr id="9" name="Picture 8"/>
+          <p:cNvPicPr>
+            <a:picLocks noChangeAspect="1"/>
+          </p:cNvPicPr>
+          <p:nvPr/>
+        </p:nvPicPr>
+        <p:blipFill>
+          <a:blip r:embed="rId2"/>
+          <a:stretch>
+            <a:fillRect/>
+          </a:stretch>
+        </p:blipFill>
+        <p:spPr>
+          <a:xfrm>
+            <a:off x="5645776" y="1938504"/>
+            <a:ext cx="4542857" cy="2400000"/>
+          </a:xfrm>
+          <a:prstGeom prst="rect">
+            <a:avLst/>
+          </a:prstGeom>
+        </p:spPr>
+      </p:pic>
+      <p:sp>
+        <p:nvSpPr>
+          <p:cNvPr id="10" name="Rectangular Callout 9"/>
+          <p:cNvSpPr/>
+          <p:nvPr/>
+        </p:nvSpPr>
+        <p:spPr>
+          <a:xfrm>
+            <a:off x="6049435" y="5285535"/>
+            <a:ext cx="2608762" cy="1321724"/>
+          </a:xfrm>
+          <a:prstGeom prst="wedgeRectCallout">
+            <a:avLst>
+              <a:gd name="adj1" fmla="val -62503"/>
+              <a:gd name="adj2" fmla="val -205424"/>
+            </a:avLst>
+          </a:prstGeom>
+        </p:spPr>
+        <p:style>
+          <a:lnRef idx="2">
+            <a:schemeClr val="accent3">
+              <a:shade val="50000"/>
+            </a:schemeClr>
+          </a:lnRef>
+          <a:fillRef idx="1">
+            <a:schemeClr val="accent3"/>
+          </a:fillRef>
+          <a:effectRef idx="0">
+            <a:schemeClr val="accent3"/>
+          </a:effectRef>
+          <a:fontRef idx="minor">
+            <a:schemeClr val="lt1"/>
+          </a:fontRef>
+        </p:style>
+        <p:txBody>
+          <a:bodyPr rtlCol="0" anchor="ctr"/>
+          <a:lstStyle/>
+          <a:p>
+            <a:pPr algn="ctr"/>
+            <a:r>
+              <a:rPr lang="en-US" dirty="0" smtClean="0"/>
+              <a:t>New trick: </a:t>
+            </a:r>
+            <a:r>
+              <a:rPr lang="en-US" dirty="0" err="1" smtClean="0"/>
+              <a:t>luigi</a:t>
+            </a:r>
+            <a:r>
+              <a:rPr lang="en-US" dirty="0" smtClean="0"/>
+              <a:t> inherit decorator, inherits parameters only</a:t>
+            </a:r>
+            <a:endParaRPr lang="en-US" dirty="0"/>
+          </a:p>
+        </p:txBody>
+      </p:sp>
+      <p:sp>
+        <p:nvSpPr>
+          <p:cNvPr id="11" name="Rectangular Callout 10"/>
+          <p:cNvSpPr/>
+          <p:nvPr/>
+        </p:nvSpPr>
+        <p:spPr>
+          <a:xfrm>
+            <a:off x="9426633" y="4806631"/>
+            <a:ext cx="2560320" cy="1778923"/>
+          </a:xfrm>
+          <a:prstGeom prst="wedgeRectCallout">
+            <a:avLst>
+              <a:gd name="adj1" fmla="val -68236"/>
+              <a:gd name="adj2" fmla="val -126752"/>
+            </a:avLst>
+          </a:prstGeom>
+        </p:spPr>
+        <p:style>
+          <a:lnRef idx="2">
+            <a:schemeClr val="accent2">
+              <a:shade val="50000"/>
+            </a:schemeClr>
+          </a:lnRef>
+          <a:fillRef idx="1">
+            <a:schemeClr val="accent2"/>
+          </a:fillRef>
+          <a:effectRef idx="0">
+            <a:schemeClr val="accent2"/>
+          </a:effectRef>
+          <a:fontRef idx="minor">
+            <a:schemeClr val="lt1"/>
+          </a:fontRef>
+        </p:style>
+        <p:txBody>
+          <a:bodyPr rtlCol="0" anchor="ctr"/>
+          <a:lstStyle/>
+          <a:p>
+            <a:pPr algn="ctr"/>
+            <a:r>
+              <a:rPr lang="en-US" dirty="0" smtClean="0"/>
+              <a:t>New trick: </a:t>
+            </a:r>
+            <a:r>
+              <a:rPr lang="en-US" dirty="0" err="1" smtClean="0"/>
+              <a:t>WrapperTask</a:t>
+            </a:r>
+            <a:r>
+              <a:rPr lang="en-US" dirty="0" smtClean="0"/>
+              <a:t>, wrapper to pull multiple independent tasks together</a:t>
+            </a:r>
+            <a:endParaRPr lang="en-US" dirty="0"/>
+          </a:p>
+        </p:txBody>
+      </p:sp>
+    </p:spTree>
+    <p:extLst>
+      <p:ext uri="{BB962C8B-B14F-4D97-AF65-F5344CB8AC3E}">
+        <p14:creationId xmlns:p14="http://schemas.microsoft.com/office/powerpoint/2010/main" val="3037101226"/>
+      </p:ext>
+    </p:extLst>
+  </p:cSld>
+  <p:clrMapOvr>
+    <a:masterClrMapping/>
+  </p:clrMapOvr>
+</p:sld>
+</file>
+
+<file path=ppt/slides/slide14.xml><?xml version="1.0" encoding="utf-8"?>
 <p:sld xmlns:a="http://schemas.openxmlformats.org/drawingml/2006/main" xmlns:r="http://schemas.openxmlformats.org/officeDocument/2006/relationships" xmlns:p="http://schemas.openxmlformats.org/presentationml/2006/main">
   <p:cSld>
     <p:spTree>
@@ -26074,7 +26790,7 @@
 </p:sld>
 </file>
 
-<file path=ppt/slides/slide14.xml><?xml version="1.0" encoding="utf-8"?>
+<file path=ppt/slides/slide15.xml><?xml version="1.0" encoding="utf-8"?>
 <p:sld xmlns:a="http://schemas.openxmlformats.org/drawingml/2006/main" xmlns:r="http://schemas.openxmlformats.org/officeDocument/2006/relationships" xmlns:p="http://schemas.openxmlformats.org/presentationml/2006/main">
   <p:cSld>
     <p:spTree>
@@ -26260,7 +26976,177 @@
 </p:sld>
 </file>
 
-<file path=ppt/slides/slide15.xml><?xml version="1.0" encoding="utf-8"?>
+<file path=ppt/slides/slide16.xml><?xml version="1.0" encoding="utf-8"?>
+<p:sld xmlns:a="http://schemas.openxmlformats.org/drawingml/2006/main" xmlns:r="http://schemas.openxmlformats.org/officeDocument/2006/relationships" xmlns:p="http://schemas.openxmlformats.org/presentationml/2006/main">
+  <p:cSld>
+    <p:spTree>
+      <p:nvGrpSpPr>
+        <p:cNvPr id="1" name=""/>
+        <p:cNvGrpSpPr/>
+        <p:nvPr/>
+      </p:nvGrpSpPr>
+      <p:grpSpPr>
+        <a:xfrm>
+          <a:off x="0" y="0"/>
+          <a:ext cx="0" cy="0"/>
+          <a:chOff x="0" y="0"/>
+          <a:chExt cx="0" cy="0"/>
+        </a:xfrm>
+      </p:grpSpPr>
+      <p:sp>
+        <p:nvSpPr>
+          <p:cNvPr id="2" name="Title 1"/>
+          <p:cNvSpPr>
+            <a:spLocks noGrp="1"/>
+          </p:cNvSpPr>
+          <p:nvPr>
+            <p:ph type="title"/>
+          </p:nvPr>
+        </p:nvSpPr>
+        <p:spPr/>
+        <p:txBody>
+          <a:bodyPr/>
+          <a:lstStyle/>
+          <a:p>
+            <a:r>
+              <a:rPr lang="en-US" dirty="0" smtClean="0"/>
+              <a:t>Docker and Travis integration</a:t>
+            </a:r>
+            <a:endParaRPr lang="en-US" dirty="0"/>
+          </a:p>
+        </p:txBody>
+      </p:sp>
+      <p:pic>
+        <p:nvPicPr>
+          <p:cNvPr id="4" name="Picture 3"/>
+          <p:cNvPicPr>
+            <a:picLocks noChangeAspect="1"/>
+          </p:cNvPicPr>
+          <p:nvPr/>
+        </p:nvPicPr>
+        <p:blipFill>
+          <a:blip r:embed="rId2"/>
+          <a:stretch>
+            <a:fillRect/>
+          </a:stretch>
+        </p:blipFill>
+        <p:spPr>
+          <a:xfrm>
+            <a:off x="50819" y="2294313"/>
+            <a:ext cx="4319416" cy="4106487"/>
+          </a:xfrm>
+          <a:prstGeom prst="rect">
+            <a:avLst/>
+          </a:prstGeom>
+        </p:spPr>
+      </p:pic>
+      <p:pic>
+        <p:nvPicPr>
+          <p:cNvPr id="7" name="Picture 6"/>
+          <p:cNvPicPr>
+            <a:picLocks noChangeAspect="1"/>
+          </p:cNvPicPr>
+          <p:nvPr/>
+        </p:nvPicPr>
+        <p:blipFill>
+          <a:blip r:embed="rId3"/>
+          <a:stretch>
+            <a:fillRect/>
+          </a:stretch>
+        </p:blipFill>
+        <p:spPr>
+          <a:xfrm>
+            <a:off x="8189659" y="4794178"/>
+            <a:ext cx="4002341" cy="2063822"/>
+          </a:xfrm>
+          <a:prstGeom prst="rect">
+            <a:avLst/>
+          </a:prstGeom>
+        </p:spPr>
+      </p:pic>
+      <p:pic>
+        <p:nvPicPr>
+          <p:cNvPr id="8" name="Picture 7"/>
+          <p:cNvPicPr>
+            <a:picLocks noChangeAspect="1"/>
+          </p:cNvPicPr>
+          <p:nvPr/>
+        </p:nvPicPr>
+        <p:blipFill>
+          <a:blip r:embed="rId4"/>
+          <a:stretch>
+            <a:fillRect/>
+          </a:stretch>
+        </p:blipFill>
+        <p:spPr>
+          <a:xfrm>
+            <a:off x="5643376" y="1932790"/>
+            <a:ext cx="6548624" cy="2861388"/>
+          </a:xfrm>
+          <a:prstGeom prst="rect">
+            <a:avLst/>
+          </a:prstGeom>
+        </p:spPr>
+      </p:pic>
+      <p:sp>
+        <p:nvSpPr>
+          <p:cNvPr id="9" name="TextBox 8"/>
+          <p:cNvSpPr txBox="1"/>
+          <p:nvPr/>
+        </p:nvSpPr>
+        <p:spPr>
+          <a:xfrm>
+            <a:off x="4605251" y="5120640"/>
+            <a:ext cx="3466407" cy="646331"/>
+          </a:xfrm>
+          <a:prstGeom prst="rect">
+            <a:avLst/>
+          </a:prstGeom>
+        </p:spPr>
+        <p:style>
+          <a:lnRef idx="2">
+            <a:schemeClr val="accent6">
+              <a:shade val="50000"/>
+            </a:schemeClr>
+          </a:lnRef>
+          <a:fillRef idx="1">
+            <a:schemeClr val="accent6"/>
+          </a:fillRef>
+          <a:effectRef idx="0">
+            <a:schemeClr val="accent6"/>
+          </a:effectRef>
+          <a:fontRef idx="minor">
+            <a:schemeClr val="lt1"/>
+          </a:fontRef>
+        </p:style>
+        <p:txBody>
+          <a:bodyPr wrap="square" rtlCol="0">
+            <a:spAutoFit/>
+          </a:bodyPr>
+          <a:lstStyle/>
+          <a:p>
+            <a:r>
+              <a:rPr lang="en-US" dirty="0" smtClean="0"/>
+              <a:t>Travis implemented with just one stage</a:t>
+            </a:r>
+            <a:endParaRPr lang="en-US" dirty="0"/>
+          </a:p>
+        </p:txBody>
+      </p:sp>
+    </p:spTree>
+    <p:extLst>
+      <p:ext uri="{BB962C8B-B14F-4D97-AF65-F5344CB8AC3E}">
+        <p14:creationId xmlns:p14="http://schemas.microsoft.com/office/powerpoint/2010/main" val="809185957"/>
+      </p:ext>
+    </p:extLst>
+  </p:cSld>
+  <p:clrMapOvr>
+    <a:masterClrMapping/>
+  </p:clrMapOvr>
+</p:sld>
+</file>
+
+<file path=ppt/slides/slide17.xml><?xml version="1.0" encoding="utf-8"?>
 <p:sld xmlns:a="http://schemas.openxmlformats.org/drawingml/2006/main" xmlns:r="http://schemas.openxmlformats.org/officeDocument/2006/relationships" xmlns:p="http://schemas.openxmlformats.org/presentationml/2006/main">
   <p:cSld>
     <p:spTree>
@@ -26332,8 +27218,8 @@
         </p:nvSpPr>
         <p:spPr>
           <a:xfrm>
-            <a:off x="6366124" y="5936028"/>
-            <a:ext cx="5487400" cy="646331"/>
+            <a:off x="6282997" y="5649341"/>
+            <a:ext cx="5700545" cy="923330"/>
           </a:xfrm>
           <a:prstGeom prst="rect">
             <a:avLst/>
@@ -26354,7 +27240,7 @@
           </a:fontRef>
         </p:style>
         <p:txBody>
-          <a:bodyPr wrap="none" rtlCol="0">
+          <a:bodyPr wrap="square" rtlCol="0">
             <a:spAutoFit/>
           </a:bodyPr>
           <a:lstStyle/>
@@ -26369,7 +27255,7 @@
               <a:rPr lang="en-US" dirty="0">
                 <a:hlinkClick r:id="rId3"/>
               </a:rPr>
-              <a:t>https://github.com/zhangchipku/luigi_RNA_seq</a:t>
+              <a:t>https://github.com/csci-e-29/2019fa-final-project-zhangchipku</a:t>
             </a:r>
             <a:endParaRPr lang="en-US" dirty="0"/>
           </a:p>

</xml_diff>